<commit_message>
flesh out examples in the first section
</commit_message>
<xml_diff>
--- a/pygotham-2019.pptx
+++ b/pygotham-2019.pptx
@@ -13,12 +13,15 @@
     <p:sldId id="260" r:id="rId7"/>
     <p:sldId id="261" r:id="rId8"/>
     <p:sldId id="262" r:id="rId9"/>
-    <p:sldId id="264" r:id="rId10"/>
-    <p:sldId id="267" r:id="rId11"/>
-    <p:sldId id="265" r:id="rId12"/>
-    <p:sldId id="268" r:id="rId13"/>
-    <p:sldId id="266" r:id="rId14"/>
-    <p:sldId id="269" r:id="rId15"/>
+    <p:sldId id="270" r:id="rId10"/>
+    <p:sldId id="271" r:id="rId11"/>
+    <p:sldId id="272" r:id="rId12"/>
+    <p:sldId id="264" r:id="rId13"/>
+    <p:sldId id="267" r:id="rId14"/>
+    <p:sldId id="265" r:id="rId15"/>
+    <p:sldId id="268" r:id="rId16"/>
+    <p:sldId id="266" r:id="rId17"/>
+    <p:sldId id="269" r:id="rId18"/>
   </p:sldIdLst>
   <p:sldSz cx="12192000" cy="6858000"/>
   <p:notesSz cx="6858000" cy="9144000"/>
@@ -3432,7 +3435,7 @@
           <p:cNvPr id="2" name="Title 1">
             <a:extLst>
               <a:ext uri="{FF2B5EF4-FFF2-40B4-BE49-F238E27FC236}">
-                <a16:creationId xmlns:a16="http://schemas.microsoft.com/office/drawing/2014/main" id="{5A3DEEE5-535A-DB47-8513-B8B4D26736B5}"/>
+                <a16:creationId xmlns:a16="http://schemas.microsoft.com/office/drawing/2014/main" id="{1776F58C-DA5A-4E45-B713-14642573C52F}"/>
               </a:ext>
             </a:extLst>
           </p:cNvPr>
@@ -3450,7 +3453,7 @@
           <a:p>
             <a:r>
               <a:rPr lang="en-US" dirty="0"/>
-              <a:t>Common Table Expressions</a:t>
+              <a:t>Types and Operators (Example 01)</a:t>
             </a:r>
           </a:p>
         </p:txBody>
@@ -3460,7 +3463,7 @@
           <p:cNvPr id="3" name="Content Placeholder 2">
             <a:extLst>
               <a:ext uri="{FF2B5EF4-FFF2-40B4-BE49-F238E27FC236}">
-                <a16:creationId xmlns:a16="http://schemas.microsoft.com/office/drawing/2014/main" id="{095A8036-E9FE-F04D-A1A8-366F25088E70}"/>
+                <a16:creationId xmlns:a16="http://schemas.microsoft.com/office/drawing/2014/main" id="{51A23D16-C618-3A4A-8FE2-D46A9E3FB2F9}"/>
               </a:ext>
             </a:extLst>
           </p:cNvPr>
@@ -3473,17 +3476,332 @@
         </p:nvSpPr>
         <p:spPr/>
         <p:txBody>
-          <a:bodyPr/>
-          <a:lstStyle/>
-          <a:p>
-            <a:endParaRPr lang="en-US"/>
+          <a:bodyPr>
+            <a:normAutofit/>
+          </a:bodyPr>
+          <a:lstStyle/>
+          <a:p>
+            <a:pPr marL="0" indent="0">
+              <a:buNone/>
+            </a:pPr>
+            <a:r>
+              <a:rPr lang="en-US" sz="2000" dirty="0">
+                <a:solidFill>
+                  <a:srgbClr val="000000"/>
+                </a:solidFill>
+                <a:latin typeface="Menlo" panose="020B0609030804020204" pitchFamily="49" charset="0"/>
+              </a:rPr>
+              <a:t>counts = (</a:t>
+            </a:r>
+          </a:p>
+          <a:p>
+            <a:pPr marL="0" indent="0">
+              <a:buNone/>
+            </a:pPr>
+            <a:r>
+              <a:rPr lang="en-US" sz="2000" dirty="0">
+                <a:solidFill>
+                  <a:srgbClr val="000000"/>
+                </a:solidFill>
+                <a:latin typeface="Menlo" panose="020B0609030804020204" pitchFamily="49" charset="0"/>
+              </a:rPr>
+              <a:t>    </a:t>
+            </a:r>
+            <a:r>
+              <a:rPr lang="en-US" sz="2000" dirty="0" err="1">
+                <a:solidFill>
+                  <a:srgbClr val="000000"/>
+                </a:solidFill>
+                <a:latin typeface="Menlo" panose="020B0609030804020204" pitchFamily="49" charset="0"/>
+              </a:rPr>
+              <a:t>meta.session.query</a:t>
+            </a:r>
+            <a:r>
+              <a:rPr lang="en-US" sz="2000" dirty="0">
+                <a:solidFill>
+                  <a:srgbClr val="000000"/>
+                </a:solidFill>
+                <a:latin typeface="Menlo" panose="020B0609030804020204" pitchFamily="49" charset="0"/>
+              </a:rPr>
+              <a:t>(</a:t>
+            </a:r>
+          </a:p>
+          <a:p>
+            <a:pPr marL="0" indent="0">
+              <a:buNone/>
+            </a:pPr>
+            <a:r>
+              <a:rPr lang="en-US" sz="2000" dirty="0">
+                <a:solidFill>
+                  <a:srgbClr val="000000"/>
+                </a:solidFill>
+                <a:latin typeface="Menlo" panose="020B0609030804020204" pitchFamily="49" charset="0"/>
+              </a:rPr>
+              <a:t>        </a:t>
+            </a:r>
+            <a:r>
+              <a:rPr lang="en-US" sz="2000" dirty="0" err="1">
+                <a:solidFill>
+                  <a:srgbClr val="000000"/>
+                </a:solidFill>
+                <a:latin typeface="Menlo" panose="020B0609030804020204" pitchFamily="49" charset="0"/>
+              </a:rPr>
+              <a:t>func.unnest</a:t>
+            </a:r>
+            <a:r>
+              <a:rPr lang="en-US" sz="2000" dirty="0">
+                <a:solidFill>
+                  <a:srgbClr val="000000"/>
+                </a:solidFill>
+                <a:latin typeface="Menlo" panose="020B0609030804020204" pitchFamily="49" charset="0"/>
+              </a:rPr>
+              <a:t>(</a:t>
+            </a:r>
+            <a:r>
+              <a:rPr lang="en-US" sz="2000" dirty="0" err="1">
+                <a:solidFill>
+                  <a:srgbClr val="000000"/>
+                </a:solidFill>
+                <a:latin typeface="Menlo" panose="020B0609030804020204" pitchFamily="49" charset="0"/>
+              </a:rPr>
+              <a:t>model.Record.tags</a:t>
+            </a:r>
+            <a:r>
+              <a:rPr lang="en-US" sz="2000" dirty="0">
+                <a:solidFill>
+                  <a:srgbClr val="000000"/>
+                </a:solidFill>
+                <a:latin typeface="Menlo" panose="020B0609030804020204" pitchFamily="49" charset="0"/>
+              </a:rPr>
+              <a:t>).label(</a:t>
+            </a:r>
+            <a:r>
+              <a:rPr lang="en-US" sz="2000" dirty="0">
+                <a:solidFill>
+                  <a:srgbClr val="9FA01C"/>
+                </a:solidFill>
+                <a:latin typeface="Menlo" panose="020B0609030804020204" pitchFamily="49" charset="0"/>
+              </a:rPr>
+              <a:t>"tag"</a:t>
+            </a:r>
+            <a:r>
+              <a:rPr lang="en-US" sz="2000" dirty="0">
+                <a:solidFill>
+                  <a:srgbClr val="000000"/>
+                </a:solidFill>
+                <a:latin typeface="Menlo" panose="020B0609030804020204" pitchFamily="49" charset="0"/>
+              </a:rPr>
+              <a:t>),</a:t>
+            </a:r>
+          </a:p>
+          <a:p>
+            <a:pPr marL="0" indent="0">
+              <a:buNone/>
+            </a:pPr>
+            <a:r>
+              <a:rPr lang="en-US" sz="2000" dirty="0">
+                <a:solidFill>
+                  <a:srgbClr val="000000"/>
+                </a:solidFill>
+                <a:latin typeface="Menlo" panose="020B0609030804020204" pitchFamily="49" charset="0"/>
+              </a:rPr>
+              <a:t>        </a:t>
+            </a:r>
+            <a:r>
+              <a:rPr lang="en-US" sz="2000" dirty="0" err="1">
+                <a:solidFill>
+                  <a:srgbClr val="000000"/>
+                </a:solidFill>
+                <a:latin typeface="Menlo" panose="020B0609030804020204" pitchFamily="49" charset="0"/>
+              </a:rPr>
+              <a:t>func.count</a:t>
+            </a:r>
+            <a:r>
+              <a:rPr lang="en-US" sz="2000" dirty="0">
+                <a:solidFill>
+                  <a:srgbClr val="000000"/>
+                </a:solidFill>
+                <a:latin typeface="Menlo" panose="020B0609030804020204" pitchFamily="49" charset="0"/>
+              </a:rPr>
+              <a:t>().label(</a:t>
+            </a:r>
+            <a:r>
+              <a:rPr lang="en-US" sz="2000" dirty="0">
+                <a:solidFill>
+                  <a:srgbClr val="9FA01C"/>
+                </a:solidFill>
+                <a:latin typeface="Menlo" panose="020B0609030804020204" pitchFamily="49" charset="0"/>
+              </a:rPr>
+              <a:t>"count"</a:t>
+            </a:r>
+            <a:r>
+              <a:rPr lang="en-US" sz="2000" dirty="0">
+                <a:solidFill>
+                  <a:srgbClr val="000000"/>
+                </a:solidFill>
+                <a:latin typeface="Menlo" panose="020B0609030804020204" pitchFamily="49" charset="0"/>
+              </a:rPr>
+              <a:t>),</a:t>
+            </a:r>
+          </a:p>
+          <a:p>
+            <a:pPr marL="0" indent="0">
+              <a:buNone/>
+            </a:pPr>
+            <a:r>
+              <a:rPr lang="en-US" sz="2000" dirty="0">
+                <a:solidFill>
+                  <a:srgbClr val="000000"/>
+                </a:solidFill>
+                <a:latin typeface="Menlo" panose="020B0609030804020204" pitchFamily="49" charset="0"/>
+              </a:rPr>
+              <a:t>    )</a:t>
+            </a:r>
+          </a:p>
+          <a:p>
+            <a:pPr marL="0" indent="0">
+              <a:buNone/>
+            </a:pPr>
+            <a:r>
+              <a:rPr lang="en-US" sz="2000" dirty="0">
+                <a:solidFill>
+                  <a:srgbClr val="000000"/>
+                </a:solidFill>
+                <a:latin typeface="Menlo" panose="020B0609030804020204" pitchFamily="49" charset="0"/>
+              </a:rPr>
+              <a:t>    .</a:t>
+            </a:r>
+            <a:r>
+              <a:rPr lang="en-US" sz="2000" dirty="0" err="1">
+                <a:solidFill>
+                  <a:srgbClr val="000000"/>
+                </a:solidFill>
+                <a:latin typeface="Menlo" panose="020B0609030804020204" pitchFamily="49" charset="0"/>
+              </a:rPr>
+              <a:t>group_by</a:t>
+            </a:r>
+            <a:r>
+              <a:rPr lang="en-US" sz="2000" dirty="0">
+                <a:solidFill>
+                  <a:srgbClr val="000000"/>
+                </a:solidFill>
+                <a:latin typeface="Menlo" panose="020B0609030804020204" pitchFamily="49" charset="0"/>
+              </a:rPr>
+              <a:t>(literal(</a:t>
+            </a:r>
+            <a:r>
+              <a:rPr lang="en-US" sz="2000" dirty="0">
+                <a:solidFill>
+                  <a:srgbClr val="9FA01C"/>
+                </a:solidFill>
+                <a:latin typeface="Menlo" panose="020B0609030804020204" pitchFamily="49" charset="0"/>
+              </a:rPr>
+              <a:t>1</a:t>
+            </a:r>
+            <a:r>
+              <a:rPr lang="en-US" sz="2000" dirty="0">
+                <a:solidFill>
+                  <a:srgbClr val="000000"/>
+                </a:solidFill>
+                <a:latin typeface="Menlo" panose="020B0609030804020204" pitchFamily="49" charset="0"/>
+              </a:rPr>
+              <a:t>))</a:t>
+            </a:r>
+          </a:p>
+          <a:p>
+            <a:pPr marL="0" indent="0">
+              <a:buNone/>
+            </a:pPr>
+            <a:r>
+              <a:rPr lang="en-US" sz="2000" dirty="0">
+                <a:solidFill>
+                  <a:srgbClr val="000000"/>
+                </a:solidFill>
+                <a:latin typeface="Menlo" panose="020B0609030804020204" pitchFamily="49" charset="0"/>
+              </a:rPr>
+              <a:t>    .</a:t>
+            </a:r>
+            <a:r>
+              <a:rPr lang="en-US" sz="2000" dirty="0" err="1">
+                <a:solidFill>
+                  <a:srgbClr val="000000"/>
+                </a:solidFill>
+                <a:latin typeface="Menlo" panose="020B0609030804020204" pitchFamily="49" charset="0"/>
+              </a:rPr>
+              <a:t>order_by</a:t>
+            </a:r>
+            <a:r>
+              <a:rPr lang="en-US" sz="2000" dirty="0">
+                <a:solidFill>
+                  <a:srgbClr val="000000"/>
+                </a:solidFill>
+                <a:latin typeface="Menlo" panose="020B0609030804020204" pitchFamily="49" charset="0"/>
+              </a:rPr>
+              <a:t>(literal(</a:t>
+            </a:r>
+            <a:r>
+              <a:rPr lang="en-US" sz="2000" dirty="0">
+                <a:solidFill>
+                  <a:srgbClr val="9FA01C"/>
+                </a:solidFill>
+                <a:latin typeface="Menlo" panose="020B0609030804020204" pitchFamily="49" charset="0"/>
+              </a:rPr>
+              <a:t>2</a:t>
+            </a:r>
+            <a:r>
+              <a:rPr lang="en-US" sz="2000" dirty="0">
+                <a:solidFill>
+                  <a:srgbClr val="000000"/>
+                </a:solidFill>
+                <a:latin typeface="Menlo" panose="020B0609030804020204" pitchFamily="49" charset="0"/>
+              </a:rPr>
+              <a:t>).desc(), literal(</a:t>
+            </a:r>
+            <a:r>
+              <a:rPr lang="en-US" sz="2000" dirty="0">
+                <a:solidFill>
+                  <a:srgbClr val="9FA01C"/>
+                </a:solidFill>
+                <a:latin typeface="Menlo" panose="020B0609030804020204" pitchFamily="49" charset="0"/>
+              </a:rPr>
+              <a:t>1</a:t>
+            </a:r>
+            <a:r>
+              <a:rPr lang="en-US" sz="2000" dirty="0">
+                <a:solidFill>
+                  <a:srgbClr val="000000"/>
+                </a:solidFill>
+                <a:latin typeface="Menlo" panose="020B0609030804020204" pitchFamily="49" charset="0"/>
+              </a:rPr>
+              <a:t>))</a:t>
+            </a:r>
+          </a:p>
+          <a:p>
+            <a:pPr marL="0" indent="0">
+              <a:buNone/>
+            </a:pPr>
+            <a:r>
+              <a:rPr lang="en-US" sz="2000" dirty="0">
+                <a:solidFill>
+                  <a:srgbClr val="000000"/>
+                </a:solidFill>
+                <a:latin typeface="Menlo" panose="020B0609030804020204" pitchFamily="49" charset="0"/>
+              </a:rPr>
+              <a:t>)</a:t>
+            </a:r>
+          </a:p>
+          <a:p>
+            <a:pPr marL="0" indent="0">
+              <a:buNone/>
+            </a:pPr>
+            <a:endParaRPr lang="en-US" dirty="0"/>
           </a:p>
         </p:txBody>
       </p:sp>
     </p:spTree>
     <p:extLst>
       <p:ext uri="{BB962C8B-B14F-4D97-AF65-F5344CB8AC3E}">
-        <p14:creationId xmlns:p14="http://schemas.microsoft.com/office/powerpoint/2010/main" val="904667563"/>
+        <p14:creationId xmlns:p14="http://schemas.microsoft.com/office/powerpoint/2010/main" val="1051829459"/>
       </p:ext>
     </p:extLst>
   </p:cSld>
@@ -3515,7 +3833,7 @@
           <p:cNvPr id="2" name="Title 1">
             <a:extLst>
               <a:ext uri="{FF2B5EF4-FFF2-40B4-BE49-F238E27FC236}">
-                <a16:creationId xmlns:a16="http://schemas.microsoft.com/office/drawing/2014/main" id="{DDDB88B1-D208-EA41-9854-6334AD5BB2AF}"/>
+                <a16:creationId xmlns:a16="http://schemas.microsoft.com/office/drawing/2014/main" id="{8FB034E1-3994-8D46-AADC-BE9F55005D10}"/>
               </a:ext>
             </a:extLst>
           </p:cNvPr>
@@ -3533,7 +3851,7 @@
           <a:p>
             <a:r>
               <a:rPr lang="en-US" dirty="0"/>
-              <a:t>Window Functions</a:t>
+              <a:t>Types and Operators (Example 01)</a:t>
             </a:r>
           </a:p>
         </p:txBody>
@@ -3543,7 +3861,7 @@
           <p:cNvPr id="3" name="Content Placeholder 2">
             <a:extLst>
               <a:ext uri="{FF2B5EF4-FFF2-40B4-BE49-F238E27FC236}">
-                <a16:creationId xmlns:a16="http://schemas.microsoft.com/office/drawing/2014/main" id="{8974BF44-A5CC-804C-863F-B21DBFEB8F39}"/>
+                <a16:creationId xmlns:a16="http://schemas.microsoft.com/office/drawing/2014/main" id="{4DFA94C1-62BF-0341-8A84-27C103E2A6C4}"/>
               </a:ext>
             </a:extLst>
           </p:cNvPr>
@@ -3556,53 +3874,271 @@
         </p:nvSpPr>
         <p:spPr/>
         <p:txBody>
-          <a:bodyPr/>
-          <a:lstStyle/>
-          <a:p>
-            <a:r>
-              <a:rPr lang="en-US" dirty="0"/>
-              <a:t>Allow you to look at rows in front of, behind, around, and everywhere</a:t>
-            </a:r>
-          </a:p>
-          <a:p>
-            <a:r>
-              <a:rPr lang="en-US" dirty="0"/>
-              <a:t>Major departure from most row-based query thinking</a:t>
-            </a:r>
-          </a:p>
-          <a:p>
-            <a:r>
-              <a:rPr lang="en-US" dirty="0"/>
-              <a:t>Favorite uses:</a:t>
-            </a:r>
-          </a:p>
-          <a:p>
-            <a:pPr lvl="1"/>
-            <a:r>
-              <a:rPr lang="en-US" dirty="0"/>
-              <a:t>Running totals</a:t>
-            </a:r>
-          </a:p>
-          <a:p>
-            <a:pPr lvl="1"/>
-            <a:r>
-              <a:rPr lang="en-US" dirty="0"/>
-              <a:t>Adding aggregates to each row</a:t>
-            </a:r>
-          </a:p>
-          <a:p>
-            <a:pPr lvl="1"/>
-            <a:r>
-              <a:rPr lang="en-US" dirty="0"/>
-              <a:t>Peeking at the next/previous row</a:t>
-            </a:r>
+          <a:bodyPr>
+            <a:noAutofit/>
+          </a:bodyPr>
+          <a:lstStyle/>
+          <a:p>
+            <a:pPr marL="0" indent="0">
+              <a:buNone/>
+            </a:pPr>
+            <a:r>
+              <a:rPr lang="en-US" sz="2000" dirty="0" err="1">
+                <a:solidFill>
+                  <a:srgbClr val="000000"/>
+                </a:solidFill>
+                <a:latin typeface="Menlo" panose="020B0609030804020204" pitchFamily="49" charset="0"/>
+              </a:rPr>
+              <a:t>unnest</a:t>
+            </a:r>
+            <a:r>
+              <a:rPr lang="en-US" sz="2000" dirty="0">
+                <a:solidFill>
+                  <a:srgbClr val="000000"/>
+                </a:solidFill>
+                <a:latin typeface="Menlo" panose="020B0609030804020204" pitchFamily="49" charset="0"/>
+              </a:rPr>
+              <a:t> and counting tags</a:t>
+            </a:r>
+          </a:p>
+          <a:p>
+            <a:pPr marL="0" indent="0">
+              <a:buNone/>
+            </a:pPr>
+            <a:r>
+              <a:rPr lang="en-US" sz="2000" dirty="0">
+                <a:solidFill>
+                  <a:srgbClr val="000000"/>
+                </a:solidFill>
+                <a:latin typeface="Menlo" panose="020B0609030804020204" pitchFamily="49" charset="0"/>
+              </a:rPr>
+              <a:t>+--------------+---------+</a:t>
+            </a:r>
+          </a:p>
+          <a:p>
+            <a:pPr marL="0" indent="0">
+              <a:buNone/>
+            </a:pPr>
+            <a:r>
+              <a:rPr lang="en-US" sz="2000" dirty="0">
+                <a:solidFill>
+                  <a:srgbClr val="000000"/>
+                </a:solidFill>
+                <a:latin typeface="Menlo" panose="020B0609030804020204" pitchFamily="49" charset="0"/>
+              </a:rPr>
+              <a:t>| tag          |   count |</a:t>
+            </a:r>
+          </a:p>
+          <a:p>
+            <a:pPr marL="0" indent="0">
+              <a:buNone/>
+            </a:pPr>
+            <a:r>
+              <a:rPr lang="en-US" sz="2000" dirty="0">
+                <a:solidFill>
+                  <a:srgbClr val="000000"/>
+                </a:solidFill>
+                <a:latin typeface="Menlo" panose="020B0609030804020204" pitchFamily="49" charset="0"/>
+              </a:rPr>
+              <a:t>|--------------+---------|</a:t>
+            </a:r>
+          </a:p>
+          <a:p>
+            <a:pPr marL="0" indent="0">
+              <a:buNone/>
+            </a:pPr>
+            <a:r>
+              <a:rPr lang="en-US" sz="2000" dirty="0">
+                <a:solidFill>
+                  <a:srgbClr val="000000"/>
+                </a:solidFill>
+                <a:latin typeface="Menlo" panose="020B0609030804020204" pitchFamily="49" charset="0"/>
+              </a:rPr>
+              <a:t>| backend      |       2 |</a:t>
+            </a:r>
+          </a:p>
+          <a:p>
+            <a:pPr marL="0" indent="0">
+              <a:buNone/>
+            </a:pPr>
+            <a:r>
+              <a:rPr lang="en-US" sz="2000" dirty="0">
+                <a:solidFill>
+                  <a:srgbClr val="000000"/>
+                </a:solidFill>
+                <a:latin typeface="Menlo" panose="020B0609030804020204" pitchFamily="49" charset="0"/>
+              </a:rPr>
+              <a:t>| defect       |       2 |</a:t>
+            </a:r>
+          </a:p>
+          <a:p>
+            <a:pPr marL="0" indent="0">
+              <a:buNone/>
+            </a:pPr>
+            <a:r>
+              <a:rPr lang="en-US" sz="2000" dirty="0">
+                <a:solidFill>
+                  <a:srgbClr val="000000"/>
+                </a:solidFill>
+                <a:latin typeface="Menlo" panose="020B0609030804020204" pitchFamily="49" charset="0"/>
+              </a:rPr>
+              <a:t>| enhancement  |       1 |</a:t>
+            </a:r>
+          </a:p>
+          <a:p>
+            <a:pPr marL="0" indent="0">
+              <a:buNone/>
+            </a:pPr>
+            <a:r>
+              <a:rPr lang="en-US" sz="2000" dirty="0">
+                <a:solidFill>
+                  <a:srgbClr val="000000"/>
+                </a:solidFill>
+                <a:latin typeface="Menlo" panose="020B0609030804020204" pitchFamily="49" charset="0"/>
+              </a:rPr>
+              <a:t>| frontend     |       1 |</a:t>
+            </a:r>
+          </a:p>
+          <a:p>
+            <a:pPr marL="0" indent="0">
+              <a:buNone/>
+            </a:pPr>
+            <a:r>
+              <a:rPr lang="en-US" sz="2000" dirty="0">
+                <a:solidFill>
+                  <a:srgbClr val="000000"/>
+                </a:solidFill>
+                <a:latin typeface="Menlo" panose="020B0609030804020204" pitchFamily="49" charset="0"/>
+              </a:rPr>
+              <a:t>| </a:t>
+            </a:r>
+            <a:r>
+              <a:rPr lang="en-US" sz="2000" dirty="0" err="1">
+                <a:solidFill>
+                  <a:srgbClr val="000000"/>
+                </a:solidFill>
+                <a:latin typeface="Menlo" panose="020B0609030804020204" pitchFamily="49" charset="0"/>
+              </a:rPr>
+              <a:t>major_change</a:t>
+            </a:r>
+            <a:r>
+              <a:rPr lang="en-US" sz="2000" dirty="0">
+                <a:solidFill>
+                  <a:srgbClr val="000000"/>
+                </a:solidFill>
+                <a:latin typeface="Menlo" panose="020B0609030804020204" pitchFamily="49" charset="0"/>
+              </a:rPr>
+              <a:t> |       1 |</a:t>
+            </a:r>
+          </a:p>
+          <a:p>
+            <a:pPr marL="0" indent="0">
+              <a:buNone/>
+            </a:pPr>
+            <a:r>
+              <a:rPr lang="en-US" sz="2000" dirty="0">
+                <a:solidFill>
+                  <a:srgbClr val="000000"/>
+                </a:solidFill>
+                <a:latin typeface="Menlo" panose="020B0609030804020204" pitchFamily="49" charset="0"/>
+              </a:rPr>
+              <a:t>| </a:t>
+            </a:r>
+            <a:r>
+              <a:rPr lang="en-US" sz="2000" dirty="0" err="1">
+                <a:solidFill>
+                  <a:srgbClr val="000000"/>
+                </a:solidFill>
+                <a:latin typeface="Menlo" panose="020B0609030804020204" pitchFamily="49" charset="0"/>
+              </a:rPr>
+              <a:t>minor_change</a:t>
+            </a:r>
+            <a:r>
+              <a:rPr lang="en-US" sz="2000" dirty="0">
+                <a:solidFill>
+                  <a:srgbClr val="000000"/>
+                </a:solidFill>
+                <a:latin typeface="Menlo" panose="020B0609030804020204" pitchFamily="49" charset="0"/>
+              </a:rPr>
+              <a:t> |       1 |</a:t>
+            </a:r>
+          </a:p>
+          <a:p>
+            <a:pPr marL="0" indent="0">
+              <a:buNone/>
+            </a:pPr>
+            <a:r>
+              <a:rPr lang="en-US" sz="2000" dirty="0">
+                <a:solidFill>
+                  <a:srgbClr val="000000"/>
+                </a:solidFill>
+                <a:latin typeface="Menlo" panose="020B0609030804020204" pitchFamily="49" charset="0"/>
+              </a:rPr>
+              <a:t>| </a:t>
+            </a:r>
+            <a:r>
+              <a:rPr lang="en-US" sz="2000" dirty="0" err="1">
+                <a:solidFill>
+                  <a:srgbClr val="000000"/>
+                </a:solidFill>
+                <a:latin typeface="Menlo" panose="020B0609030804020204" pitchFamily="49" charset="0"/>
+              </a:rPr>
+              <a:t>ui</a:t>
+            </a:r>
+            <a:r>
+              <a:rPr lang="en-US" sz="2000" dirty="0">
+                <a:solidFill>
+                  <a:srgbClr val="000000"/>
+                </a:solidFill>
+                <a:latin typeface="Menlo" panose="020B0609030804020204" pitchFamily="49" charset="0"/>
+              </a:rPr>
+              <a:t>/</a:t>
+            </a:r>
+            <a:r>
+              <a:rPr lang="en-US" sz="2000" dirty="0" err="1">
+                <a:solidFill>
+                  <a:srgbClr val="000000"/>
+                </a:solidFill>
+                <a:latin typeface="Menlo" panose="020B0609030804020204" pitchFamily="49" charset="0"/>
+              </a:rPr>
+              <a:t>ux</a:t>
+            </a:r>
+            <a:r>
+              <a:rPr lang="en-US" sz="2000" dirty="0">
+                <a:solidFill>
+                  <a:srgbClr val="000000"/>
+                </a:solidFill>
+                <a:latin typeface="Menlo" panose="020B0609030804020204" pitchFamily="49" charset="0"/>
+              </a:rPr>
+              <a:t>        |       1 |</a:t>
+            </a:r>
+          </a:p>
+          <a:p>
+            <a:pPr marL="0" indent="0">
+              <a:buNone/>
+            </a:pPr>
+            <a:r>
+              <a:rPr lang="en-US" sz="2000" dirty="0">
+                <a:solidFill>
+                  <a:srgbClr val="000000"/>
+                </a:solidFill>
+                <a:latin typeface="Menlo" panose="020B0609030804020204" pitchFamily="49" charset="0"/>
+              </a:rPr>
+              <a:t>+--------------+---------+</a:t>
+            </a:r>
+          </a:p>
+          <a:p>
+            <a:pPr marL="0" indent="0">
+              <a:buNone/>
+            </a:pPr>
+            <a:endParaRPr lang="en-US" sz="2000" dirty="0"/>
           </a:p>
         </p:txBody>
       </p:sp>
     </p:spTree>
     <p:extLst>
       <p:ext uri="{BB962C8B-B14F-4D97-AF65-F5344CB8AC3E}">
-        <p14:creationId xmlns:p14="http://schemas.microsoft.com/office/powerpoint/2010/main" val="3315609856"/>
+        <p14:creationId xmlns:p14="http://schemas.microsoft.com/office/powerpoint/2010/main" val="527998181"/>
       </p:ext>
     </p:extLst>
   </p:cSld>
@@ -3634,7 +4170,7 @@
           <p:cNvPr id="2" name="Title 1">
             <a:extLst>
               <a:ext uri="{FF2B5EF4-FFF2-40B4-BE49-F238E27FC236}">
-                <a16:creationId xmlns:a16="http://schemas.microsoft.com/office/drawing/2014/main" id="{C4111D89-6FA8-2F4F-9675-3BA9A659104E}"/>
+                <a16:creationId xmlns:a16="http://schemas.microsoft.com/office/drawing/2014/main" id="{2D5809F7-8767-4B47-9582-289BECDC5EF4}"/>
               </a:ext>
             </a:extLst>
           </p:cNvPr>
@@ -3652,7 +4188,7 @@
           <a:p>
             <a:r>
               <a:rPr lang="en-US" dirty="0"/>
-              <a:t>Window Functions</a:t>
+              <a:t>Common Table Expressions</a:t>
             </a:r>
           </a:p>
         </p:txBody>
@@ -3662,7 +4198,7 @@
           <p:cNvPr id="3" name="Content Placeholder 2">
             <a:extLst>
               <a:ext uri="{FF2B5EF4-FFF2-40B4-BE49-F238E27FC236}">
-                <a16:creationId xmlns:a16="http://schemas.microsoft.com/office/drawing/2014/main" id="{40702393-37D2-0940-8EB2-3238C45D83D4}"/>
+                <a16:creationId xmlns:a16="http://schemas.microsoft.com/office/drawing/2014/main" id="{84710E21-7F29-224E-8009-9FF48C43AD84}"/>
               </a:ext>
             </a:extLst>
           </p:cNvPr>
@@ -3678,14 +4214,58 @@
           <a:bodyPr/>
           <a:lstStyle/>
           <a:p>
-            <a:endParaRPr lang="en-US"/>
+            <a:r>
+              <a:rPr lang="en-US" dirty="0"/>
+              <a:t>SQL’s ability to be abstracted is limited (another reason </a:t>
+            </a:r>
+            <a:r>
+              <a:rPr lang="en-US" dirty="0" err="1"/>
+              <a:t>SQLAlchemy</a:t>
+            </a:r>
+            <a:r>
+              <a:rPr lang="en-US" dirty="0"/>
+              <a:t> is so awesome!)</a:t>
+            </a:r>
+          </a:p>
+          <a:p>
+            <a:r>
+              <a:rPr lang="en-US" dirty="0"/>
+              <a:t>Common Table Expressions (CTEs) allow you to break your queries up into smaller, more manageable/composable pieces</a:t>
+            </a:r>
+          </a:p>
+          <a:p>
+            <a:pPr lvl="1"/>
+            <a:r>
+              <a:rPr lang="en-US" dirty="0"/>
+              <a:t>Subqueries perform this job too, but can make the rendered SQL really hard to read</a:t>
+            </a:r>
+          </a:p>
+          <a:p>
+            <a:r>
+              <a:rPr lang="en-US" dirty="0"/>
+              <a:t>Favorite uses:</a:t>
+            </a:r>
+          </a:p>
+          <a:p>
+            <a:pPr lvl="1"/>
+            <a:r>
+              <a:rPr lang="en-US" dirty="0"/>
+              <a:t>Incremental query development</a:t>
+            </a:r>
+          </a:p>
+          <a:p>
+            <a:pPr lvl="1"/>
+            <a:r>
+              <a:rPr lang="en-US" dirty="0"/>
+              <a:t>Optimization fencing</a:t>
+            </a:r>
           </a:p>
         </p:txBody>
       </p:sp>
     </p:spTree>
     <p:extLst>
       <p:ext uri="{BB962C8B-B14F-4D97-AF65-F5344CB8AC3E}">
-        <p14:creationId xmlns:p14="http://schemas.microsoft.com/office/powerpoint/2010/main" val="1082284344"/>
+        <p14:creationId xmlns:p14="http://schemas.microsoft.com/office/powerpoint/2010/main" val="2504300282"/>
       </p:ext>
     </p:extLst>
   </p:cSld>
@@ -3717,6 +4297,291 @@
           <p:cNvPr id="2" name="Title 1">
             <a:extLst>
               <a:ext uri="{FF2B5EF4-FFF2-40B4-BE49-F238E27FC236}">
+                <a16:creationId xmlns:a16="http://schemas.microsoft.com/office/drawing/2014/main" id="{5A3DEEE5-535A-DB47-8513-B8B4D26736B5}"/>
+              </a:ext>
+            </a:extLst>
+          </p:cNvPr>
+          <p:cNvSpPr>
+            <a:spLocks noGrp="1"/>
+          </p:cNvSpPr>
+          <p:nvPr>
+            <p:ph type="title"/>
+          </p:nvPr>
+        </p:nvSpPr>
+        <p:spPr/>
+        <p:txBody>
+          <a:bodyPr/>
+          <a:lstStyle/>
+          <a:p>
+            <a:r>
+              <a:rPr lang="en-US" dirty="0"/>
+              <a:t>Common Table Expressions</a:t>
+            </a:r>
+          </a:p>
+        </p:txBody>
+      </p:sp>
+      <p:sp>
+        <p:nvSpPr>
+          <p:cNvPr id="3" name="Content Placeholder 2">
+            <a:extLst>
+              <a:ext uri="{FF2B5EF4-FFF2-40B4-BE49-F238E27FC236}">
+                <a16:creationId xmlns:a16="http://schemas.microsoft.com/office/drawing/2014/main" id="{095A8036-E9FE-F04D-A1A8-366F25088E70}"/>
+              </a:ext>
+            </a:extLst>
+          </p:cNvPr>
+          <p:cNvSpPr>
+            <a:spLocks noGrp="1"/>
+          </p:cNvSpPr>
+          <p:nvPr>
+            <p:ph idx="1"/>
+          </p:nvPr>
+        </p:nvSpPr>
+        <p:spPr/>
+        <p:txBody>
+          <a:bodyPr/>
+          <a:lstStyle/>
+          <a:p>
+            <a:endParaRPr lang="en-US"/>
+          </a:p>
+        </p:txBody>
+      </p:sp>
+    </p:spTree>
+    <p:extLst>
+      <p:ext uri="{BB962C8B-B14F-4D97-AF65-F5344CB8AC3E}">
+        <p14:creationId xmlns:p14="http://schemas.microsoft.com/office/powerpoint/2010/main" val="904667563"/>
+      </p:ext>
+    </p:extLst>
+  </p:cSld>
+  <p:clrMapOvr>
+    <a:masterClrMapping/>
+  </p:clrMapOvr>
+</p:sld>
+</file>
+
+<file path=ppt/slides/slide14.xml><?xml version="1.0" encoding="utf-8"?>
+<p:sld xmlns:a="http://schemas.openxmlformats.org/drawingml/2006/main" xmlns:r="http://schemas.openxmlformats.org/officeDocument/2006/relationships" xmlns:p="http://schemas.openxmlformats.org/presentationml/2006/main">
+  <p:cSld>
+    <p:spTree>
+      <p:nvGrpSpPr>
+        <p:cNvPr id="1" name=""/>
+        <p:cNvGrpSpPr/>
+        <p:nvPr/>
+      </p:nvGrpSpPr>
+      <p:grpSpPr>
+        <a:xfrm>
+          <a:off x="0" y="0"/>
+          <a:ext cx="0" cy="0"/>
+          <a:chOff x="0" y="0"/>
+          <a:chExt cx="0" cy="0"/>
+        </a:xfrm>
+      </p:grpSpPr>
+      <p:sp>
+        <p:nvSpPr>
+          <p:cNvPr id="2" name="Title 1">
+            <a:extLst>
+              <a:ext uri="{FF2B5EF4-FFF2-40B4-BE49-F238E27FC236}">
+                <a16:creationId xmlns:a16="http://schemas.microsoft.com/office/drawing/2014/main" id="{DDDB88B1-D208-EA41-9854-6334AD5BB2AF}"/>
+              </a:ext>
+            </a:extLst>
+          </p:cNvPr>
+          <p:cNvSpPr>
+            <a:spLocks noGrp="1"/>
+          </p:cNvSpPr>
+          <p:nvPr>
+            <p:ph type="title"/>
+          </p:nvPr>
+        </p:nvSpPr>
+        <p:spPr/>
+        <p:txBody>
+          <a:bodyPr/>
+          <a:lstStyle/>
+          <a:p>
+            <a:r>
+              <a:rPr lang="en-US" dirty="0"/>
+              <a:t>Window Functions</a:t>
+            </a:r>
+          </a:p>
+        </p:txBody>
+      </p:sp>
+      <p:sp>
+        <p:nvSpPr>
+          <p:cNvPr id="3" name="Content Placeholder 2">
+            <a:extLst>
+              <a:ext uri="{FF2B5EF4-FFF2-40B4-BE49-F238E27FC236}">
+                <a16:creationId xmlns:a16="http://schemas.microsoft.com/office/drawing/2014/main" id="{8974BF44-A5CC-804C-863F-B21DBFEB8F39}"/>
+              </a:ext>
+            </a:extLst>
+          </p:cNvPr>
+          <p:cNvSpPr>
+            <a:spLocks noGrp="1"/>
+          </p:cNvSpPr>
+          <p:nvPr>
+            <p:ph idx="1"/>
+          </p:nvPr>
+        </p:nvSpPr>
+        <p:spPr/>
+        <p:txBody>
+          <a:bodyPr/>
+          <a:lstStyle/>
+          <a:p>
+            <a:r>
+              <a:rPr lang="en-US" dirty="0"/>
+              <a:t>Allow you to look at rows in front of, behind, around, and everywhere</a:t>
+            </a:r>
+          </a:p>
+          <a:p>
+            <a:r>
+              <a:rPr lang="en-US" dirty="0"/>
+              <a:t>Major departure from most row-based query thinking</a:t>
+            </a:r>
+          </a:p>
+          <a:p>
+            <a:r>
+              <a:rPr lang="en-US" dirty="0"/>
+              <a:t>Favorite uses:</a:t>
+            </a:r>
+          </a:p>
+          <a:p>
+            <a:pPr lvl="1"/>
+            <a:r>
+              <a:rPr lang="en-US" dirty="0"/>
+              <a:t>Running totals</a:t>
+            </a:r>
+          </a:p>
+          <a:p>
+            <a:pPr lvl="1"/>
+            <a:r>
+              <a:rPr lang="en-US" dirty="0"/>
+              <a:t>Adding aggregates to each row</a:t>
+            </a:r>
+          </a:p>
+          <a:p>
+            <a:pPr lvl="1"/>
+            <a:r>
+              <a:rPr lang="en-US" dirty="0"/>
+              <a:t>Peeking at the next/previous row</a:t>
+            </a:r>
+          </a:p>
+        </p:txBody>
+      </p:sp>
+    </p:spTree>
+    <p:extLst>
+      <p:ext uri="{BB962C8B-B14F-4D97-AF65-F5344CB8AC3E}">
+        <p14:creationId xmlns:p14="http://schemas.microsoft.com/office/powerpoint/2010/main" val="3315609856"/>
+      </p:ext>
+    </p:extLst>
+  </p:cSld>
+  <p:clrMapOvr>
+    <a:masterClrMapping/>
+  </p:clrMapOvr>
+</p:sld>
+</file>
+
+<file path=ppt/slides/slide15.xml><?xml version="1.0" encoding="utf-8"?>
+<p:sld xmlns:a="http://schemas.openxmlformats.org/drawingml/2006/main" xmlns:r="http://schemas.openxmlformats.org/officeDocument/2006/relationships" xmlns:p="http://schemas.openxmlformats.org/presentationml/2006/main">
+  <p:cSld>
+    <p:spTree>
+      <p:nvGrpSpPr>
+        <p:cNvPr id="1" name=""/>
+        <p:cNvGrpSpPr/>
+        <p:nvPr/>
+      </p:nvGrpSpPr>
+      <p:grpSpPr>
+        <a:xfrm>
+          <a:off x="0" y="0"/>
+          <a:ext cx="0" cy="0"/>
+          <a:chOff x="0" y="0"/>
+          <a:chExt cx="0" cy="0"/>
+        </a:xfrm>
+      </p:grpSpPr>
+      <p:sp>
+        <p:nvSpPr>
+          <p:cNvPr id="2" name="Title 1">
+            <a:extLst>
+              <a:ext uri="{FF2B5EF4-FFF2-40B4-BE49-F238E27FC236}">
+                <a16:creationId xmlns:a16="http://schemas.microsoft.com/office/drawing/2014/main" id="{C4111D89-6FA8-2F4F-9675-3BA9A659104E}"/>
+              </a:ext>
+            </a:extLst>
+          </p:cNvPr>
+          <p:cNvSpPr>
+            <a:spLocks noGrp="1"/>
+          </p:cNvSpPr>
+          <p:nvPr>
+            <p:ph type="title"/>
+          </p:nvPr>
+        </p:nvSpPr>
+        <p:spPr/>
+        <p:txBody>
+          <a:bodyPr/>
+          <a:lstStyle/>
+          <a:p>
+            <a:r>
+              <a:rPr lang="en-US" dirty="0"/>
+              <a:t>Window Functions</a:t>
+            </a:r>
+          </a:p>
+        </p:txBody>
+      </p:sp>
+      <p:sp>
+        <p:nvSpPr>
+          <p:cNvPr id="3" name="Content Placeholder 2">
+            <a:extLst>
+              <a:ext uri="{FF2B5EF4-FFF2-40B4-BE49-F238E27FC236}">
+                <a16:creationId xmlns:a16="http://schemas.microsoft.com/office/drawing/2014/main" id="{40702393-37D2-0940-8EB2-3238C45D83D4}"/>
+              </a:ext>
+            </a:extLst>
+          </p:cNvPr>
+          <p:cNvSpPr>
+            <a:spLocks noGrp="1"/>
+          </p:cNvSpPr>
+          <p:nvPr>
+            <p:ph idx="1"/>
+          </p:nvPr>
+        </p:nvSpPr>
+        <p:spPr/>
+        <p:txBody>
+          <a:bodyPr/>
+          <a:lstStyle/>
+          <a:p>
+            <a:endParaRPr lang="en-US"/>
+          </a:p>
+        </p:txBody>
+      </p:sp>
+    </p:spTree>
+    <p:extLst>
+      <p:ext uri="{BB962C8B-B14F-4D97-AF65-F5344CB8AC3E}">
+        <p14:creationId xmlns:p14="http://schemas.microsoft.com/office/powerpoint/2010/main" val="1082284344"/>
+      </p:ext>
+    </p:extLst>
+  </p:cSld>
+  <p:clrMapOvr>
+    <a:masterClrMapping/>
+  </p:clrMapOvr>
+</p:sld>
+</file>
+
+<file path=ppt/slides/slide16.xml><?xml version="1.0" encoding="utf-8"?>
+<p:sld xmlns:a="http://schemas.openxmlformats.org/drawingml/2006/main" xmlns:r="http://schemas.openxmlformats.org/officeDocument/2006/relationships" xmlns:p="http://schemas.openxmlformats.org/presentationml/2006/main">
+  <p:cSld>
+    <p:spTree>
+      <p:nvGrpSpPr>
+        <p:cNvPr id="1" name=""/>
+        <p:cNvGrpSpPr/>
+        <p:nvPr/>
+      </p:nvGrpSpPr>
+      <p:grpSpPr>
+        <a:xfrm>
+          <a:off x="0" y="0"/>
+          <a:ext cx="0" cy="0"/>
+          <a:chOff x="0" y="0"/>
+          <a:chExt cx="0" cy="0"/>
+        </a:xfrm>
+      </p:grpSpPr>
+      <p:sp>
+        <p:nvSpPr>
+          <p:cNvPr id="2" name="Title 1">
+            <a:extLst>
+              <a:ext uri="{FF2B5EF4-FFF2-40B4-BE49-F238E27FC236}">
                 <a16:creationId xmlns:a16="http://schemas.microsoft.com/office/drawing/2014/main" id="{4F34299A-27AF-BF44-AF97-0DC5EA917BC9}"/>
               </a:ext>
             </a:extLst>
@@ -3825,7 +4690,7 @@
 </p:sld>
 </file>
 
-<file path=ppt/slides/slide14.xml><?xml version="1.0" encoding="utf-8"?>
+<file path=ppt/slides/slide17.xml><?xml version="1.0" encoding="utf-8"?>
 <p:sld xmlns:a="http://schemas.openxmlformats.org/drawingml/2006/main" xmlns:r="http://schemas.openxmlformats.org/officeDocument/2006/relationships" xmlns:p="http://schemas.openxmlformats.org/presentationml/2006/main">
   <p:cSld>
     <p:spTree>
@@ -4152,7 +5017,29 @@
             </a:pPr>
             <a:r>
               <a:rPr lang="en-US" dirty="0"/>
-              <a:t>Available here on GitHub: XXX</a:t>
+              <a:t>Available here on GitHub: </a:t>
+            </a:r>
+            <a:r>
+              <a:rPr lang="en-US" dirty="0">
+                <a:hlinkClick r:id="rId2"/>
+              </a:rPr>
+              <a:t>https://github.com/f0rk/pygotham-2019</a:t>
+            </a:r>
+            <a:endParaRPr lang="en-US" dirty="0"/>
+          </a:p>
+          <a:p>
+            <a:pPr marL="0" indent="0">
+              <a:buNone/>
+            </a:pPr>
+            <a:endParaRPr lang="en-US" dirty="0"/>
+          </a:p>
+          <a:p>
+            <a:pPr marL="0" indent="0">
+              <a:buNone/>
+            </a:pPr>
+            <a:r>
+              <a:rPr lang="en-US" dirty="0"/>
+              <a:t>Examples in the code are labeled example01.py, example02.py and correspond the example number when code samples are presented.</a:t>
             </a:r>
           </a:p>
         </p:txBody>
@@ -4733,7 +5620,7 @@
           <a:p>
             <a:r>
               <a:rPr lang="en-US" dirty="0"/>
-              <a:t>Types and Operators</a:t>
+              <a:t>Types and Operators (Example 01)</a:t>
             </a:r>
           </a:p>
         </p:txBody>
@@ -4756,13 +5643,595 @@
         </p:nvSpPr>
         <p:spPr/>
         <p:txBody>
-          <a:bodyPr/>
+          <a:bodyPr>
+            <a:normAutofit/>
+          </a:bodyPr>
           <a:lstStyle/>
           <a:p>
             <a:pPr marL="0" indent="0">
               <a:buNone/>
             </a:pPr>
-            <a:endParaRPr lang="en-US" dirty="0"/>
+            <a:r>
+              <a:rPr lang="en-US" sz="2000" dirty="0" err="1">
+                <a:solidFill>
+                  <a:srgbClr val="000000"/>
+                </a:solidFill>
+                <a:latin typeface="Menlo" panose="020B0609030804020204" pitchFamily="49" charset="0"/>
+              </a:rPr>
+              <a:t>meta.session.add_all</a:t>
+            </a:r>
+            <a:r>
+              <a:rPr lang="en-US" sz="2000" dirty="0">
+                <a:solidFill>
+                  <a:srgbClr val="000000"/>
+                </a:solidFill>
+                <a:latin typeface="Menlo" panose="020B0609030804020204" pitchFamily="49" charset="0"/>
+              </a:rPr>
+              <a:t>([</a:t>
+            </a:r>
+          </a:p>
+          <a:p>
+            <a:pPr marL="0" indent="0">
+              <a:buNone/>
+            </a:pPr>
+            <a:r>
+              <a:rPr lang="en-US" sz="2000" dirty="0">
+                <a:solidFill>
+                  <a:srgbClr val="000000"/>
+                </a:solidFill>
+                <a:latin typeface="Menlo" panose="020B0609030804020204" pitchFamily="49" charset="0"/>
+              </a:rPr>
+              <a:t>  </a:t>
+            </a:r>
+            <a:r>
+              <a:rPr lang="en-US" sz="2000" dirty="0" err="1">
+                <a:solidFill>
+                  <a:srgbClr val="000000"/>
+                </a:solidFill>
+                <a:latin typeface="Menlo" panose="020B0609030804020204" pitchFamily="49" charset="0"/>
+              </a:rPr>
+              <a:t>model.Record</a:t>
+            </a:r>
+            <a:r>
+              <a:rPr lang="en-US" sz="2000" dirty="0">
+                <a:solidFill>
+                  <a:srgbClr val="000000"/>
+                </a:solidFill>
+                <a:latin typeface="Menlo" panose="020B0609030804020204" pitchFamily="49" charset="0"/>
+              </a:rPr>
+              <a:t>(tags=[</a:t>
+            </a:r>
+            <a:r>
+              <a:rPr lang="en-US" sz="2000" dirty="0">
+                <a:solidFill>
+                  <a:srgbClr val="9FA01C"/>
+                </a:solidFill>
+                <a:latin typeface="Menlo" panose="020B0609030804020204" pitchFamily="49" charset="0"/>
+              </a:rPr>
+              <a:t>"defect"</a:t>
+            </a:r>
+            <a:r>
+              <a:rPr lang="en-US" sz="2000" dirty="0">
+                <a:solidFill>
+                  <a:srgbClr val="000000"/>
+                </a:solidFill>
+                <a:latin typeface="Menlo" panose="020B0609030804020204" pitchFamily="49" charset="0"/>
+              </a:rPr>
+              <a:t>, </a:t>
+            </a:r>
+            <a:r>
+              <a:rPr lang="en-US" sz="2000" dirty="0">
+                <a:solidFill>
+                  <a:srgbClr val="9FA01C"/>
+                </a:solidFill>
+                <a:latin typeface="Menlo" panose="020B0609030804020204" pitchFamily="49" charset="0"/>
+              </a:rPr>
+              <a:t>"</a:t>
+            </a:r>
+            <a:r>
+              <a:rPr lang="en-US" sz="2000" dirty="0" err="1">
+                <a:solidFill>
+                  <a:srgbClr val="9FA01C"/>
+                </a:solidFill>
+                <a:latin typeface="Menlo" panose="020B0609030804020204" pitchFamily="49" charset="0"/>
+              </a:rPr>
+              <a:t>minor_change</a:t>
+            </a:r>
+            <a:r>
+              <a:rPr lang="en-US" sz="2000" dirty="0">
+                <a:solidFill>
+                  <a:srgbClr val="9FA01C"/>
+                </a:solidFill>
+                <a:latin typeface="Menlo" panose="020B0609030804020204" pitchFamily="49" charset="0"/>
+              </a:rPr>
+              <a:t>"</a:t>
+            </a:r>
+            <a:r>
+              <a:rPr lang="en-US" sz="2000" dirty="0">
+                <a:solidFill>
+                  <a:srgbClr val="000000"/>
+                </a:solidFill>
+                <a:latin typeface="Menlo" panose="020B0609030804020204" pitchFamily="49" charset="0"/>
+              </a:rPr>
+              <a:t>, </a:t>
+            </a:r>
+            <a:r>
+              <a:rPr lang="en-US" sz="2000" dirty="0">
+                <a:solidFill>
+                  <a:srgbClr val="9FA01C"/>
+                </a:solidFill>
+                <a:latin typeface="Menlo" panose="020B0609030804020204" pitchFamily="49" charset="0"/>
+              </a:rPr>
+              <a:t>"backend"</a:t>
+            </a:r>
+            <a:r>
+              <a:rPr lang="en-US" sz="2000" dirty="0">
+                <a:solidFill>
+                  <a:srgbClr val="000000"/>
+                </a:solidFill>
+                <a:latin typeface="Menlo" panose="020B0609030804020204" pitchFamily="49" charset="0"/>
+              </a:rPr>
+              <a:t>]),</a:t>
+            </a:r>
+            <a:endParaRPr lang="en-US" sz="2000" dirty="0">
+              <a:solidFill>
+                <a:srgbClr val="9FA01C"/>
+              </a:solidFill>
+              <a:latin typeface="Menlo" panose="020B0609030804020204" pitchFamily="49" charset="0"/>
+            </a:endParaRPr>
+          </a:p>
+          <a:p>
+            <a:pPr marL="0" indent="0">
+              <a:buNone/>
+            </a:pPr>
+            <a:r>
+              <a:rPr lang="en-US" sz="2000" dirty="0">
+                <a:solidFill>
+                  <a:srgbClr val="000000"/>
+                </a:solidFill>
+                <a:latin typeface="Menlo" panose="020B0609030804020204" pitchFamily="49" charset="0"/>
+              </a:rPr>
+              <a:t>  </a:t>
+            </a:r>
+            <a:r>
+              <a:rPr lang="en-US" sz="2000" dirty="0" err="1">
+                <a:solidFill>
+                  <a:srgbClr val="000000"/>
+                </a:solidFill>
+                <a:latin typeface="Menlo" panose="020B0609030804020204" pitchFamily="49" charset="0"/>
+              </a:rPr>
+              <a:t>model.Record</a:t>
+            </a:r>
+            <a:r>
+              <a:rPr lang="en-US" sz="2000" dirty="0">
+                <a:solidFill>
+                  <a:srgbClr val="000000"/>
+                </a:solidFill>
+                <a:latin typeface="Menlo" panose="020B0609030804020204" pitchFamily="49" charset="0"/>
+              </a:rPr>
+              <a:t>(tags=[</a:t>
+            </a:r>
+            <a:r>
+              <a:rPr lang="en-US" sz="2000" dirty="0">
+                <a:solidFill>
+                  <a:srgbClr val="9FA01C"/>
+                </a:solidFill>
+                <a:latin typeface="Menlo" panose="020B0609030804020204" pitchFamily="49" charset="0"/>
+              </a:rPr>
+              <a:t>"defect"</a:t>
+            </a:r>
+            <a:r>
+              <a:rPr lang="en-US" sz="2000" dirty="0">
+                <a:solidFill>
+                  <a:srgbClr val="000000"/>
+                </a:solidFill>
+                <a:latin typeface="Menlo" panose="020B0609030804020204" pitchFamily="49" charset="0"/>
+              </a:rPr>
+              <a:t>, </a:t>
+            </a:r>
+            <a:r>
+              <a:rPr lang="en-US" sz="2000" dirty="0">
+                <a:solidFill>
+                  <a:srgbClr val="9FA01C"/>
+                </a:solidFill>
+                <a:latin typeface="Menlo" panose="020B0609030804020204" pitchFamily="49" charset="0"/>
+              </a:rPr>
+              <a:t>"</a:t>
+            </a:r>
+            <a:r>
+              <a:rPr lang="en-US" sz="2000" dirty="0" err="1">
+                <a:solidFill>
+                  <a:srgbClr val="9FA01C"/>
+                </a:solidFill>
+                <a:latin typeface="Menlo" panose="020B0609030804020204" pitchFamily="49" charset="0"/>
+              </a:rPr>
+              <a:t>major_change</a:t>
+            </a:r>
+            <a:r>
+              <a:rPr lang="en-US" sz="2000" dirty="0">
+                <a:solidFill>
+                  <a:srgbClr val="9FA01C"/>
+                </a:solidFill>
+                <a:latin typeface="Menlo" panose="020B0609030804020204" pitchFamily="49" charset="0"/>
+              </a:rPr>
+              <a:t>"</a:t>
+            </a:r>
+            <a:r>
+              <a:rPr lang="en-US" sz="2000" dirty="0">
+                <a:solidFill>
+                  <a:srgbClr val="000000"/>
+                </a:solidFill>
+                <a:latin typeface="Menlo" panose="020B0609030804020204" pitchFamily="49" charset="0"/>
+              </a:rPr>
+              <a:t>, </a:t>
+            </a:r>
+            <a:r>
+              <a:rPr lang="en-US" sz="2000" dirty="0">
+                <a:solidFill>
+                  <a:srgbClr val="9FA01C"/>
+                </a:solidFill>
+                <a:latin typeface="Menlo" panose="020B0609030804020204" pitchFamily="49" charset="0"/>
+              </a:rPr>
+              <a:t>"backend"</a:t>
+            </a:r>
+            <a:r>
+              <a:rPr lang="en-US" sz="2000" dirty="0">
+                <a:solidFill>
+                  <a:srgbClr val="000000"/>
+                </a:solidFill>
+                <a:latin typeface="Menlo" panose="020B0609030804020204" pitchFamily="49" charset="0"/>
+              </a:rPr>
+              <a:t>]),</a:t>
+            </a:r>
+            <a:endParaRPr lang="en-US" sz="2000" dirty="0">
+              <a:solidFill>
+                <a:srgbClr val="9FA01C"/>
+              </a:solidFill>
+              <a:latin typeface="Menlo" panose="020B0609030804020204" pitchFamily="49" charset="0"/>
+            </a:endParaRPr>
+          </a:p>
+          <a:p>
+            <a:pPr marL="0" indent="0">
+              <a:buNone/>
+            </a:pPr>
+            <a:r>
+              <a:rPr lang="en-US" sz="2000" dirty="0">
+                <a:solidFill>
+                  <a:srgbClr val="000000"/>
+                </a:solidFill>
+                <a:latin typeface="Menlo" panose="020B0609030804020204" pitchFamily="49" charset="0"/>
+              </a:rPr>
+              <a:t>  </a:t>
+            </a:r>
+            <a:r>
+              <a:rPr lang="en-US" sz="2000" dirty="0" err="1">
+                <a:solidFill>
+                  <a:srgbClr val="000000"/>
+                </a:solidFill>
+                <a:latin typeface="Menlo" panose="020B0609030804020204" pitchFamily="49" charset="0"/>
+              </a:rPr>
+              <a:t>model.Record</a:t>
+            </a:r>
+            <a:r>
+              <a:rPr lang="en-US" sz="2000" dirty="0">
+                <a:solidFill>
+                  <a:srgbClr val="000000"/>
+                </a:solidFill>
+                <a:latin typeface="Menlo" panose="020B0609030804020204" pitchFamily="49" charset="0"/>
+              </a:rPr>
+              <a:t>(tags=[</a:t>
+            </a:r>
+            <a:r>
+              <a:rPr lang="en-US" sz="2000" dirty="0">
+                <a:solidFill>
+                  <a:srgbClr val="9FA01C"/>
+                </a:solidFill>
+                <a:latin typeface="Menlo" panose="020B0609030804020204" pitchFamily="49" charset="0"/>
+              </a:rPr>
+              <a:t>"enhancement"</a:t>
+            </a:r>
+            <a:r>
+              <a:rPr lang="en-US" sz="2000" dirty="0">
+                <a:solidFill>
+                  <a:srgbClr val="000000"/>
+                </a:solidFill>
+                <a:latin typeface="Menlo" panose="020B0609030804020204" pitchFamily="49" charset="0"/>
+              </a:rPr>
+              <a:t>, </a:t>
+            </a:r>
+            <a:r>
+              <a:rPr lang="en-US" sz="2000" dirty="0">
+                <a:solidFill>
+                  <a:srgbClr val="9FA01C"/>
+                </a:solidFill>
+                <a:latin typeface="Menlo" panose="020B0609030804020204" pitchFamily="49" charset="0"/>
+              </a:rPr>
+              <a:t>"</a:t>
+            </a:r>
+            <a:r>
+              <a:rPr lang="en-US" sz="2000" dirty="0" err="1">
+                <a:solidFill>
+                  <a:srgbClr val="9FA01C"/>
+                </a:solidFill>
+                <a:latin typeface="Menlo" panose="020B0609030804020204" pitchFamily="49" charset="0"/>
+              </a:rPr>
+              <a:t>ui</a:t>
+            </a:r>
+            <a:r>
+              <a:rPr lang="en-US" sz="2000" dirty="0">
+                <a:solidFill>
+                  <a:srgbClr val="9FA01C"/>
+                </a:solidFill>
+                <a:latin typeface="Menlo" panose="020B0609030804020204" pitchFamily="49" charset="0"/>
+              </a:rPr>
+              <a:t>/</a:t>
+            </a:r>
+            <a:r>
+              <a:rPr lang="en-US" sz="2000" dirty="0" err="1">
+                <a:solidFill>
+                  <a:srgbClr val="9FA01C"/>
+                </a:solidFill>
+                <a:latin typeface="Menlo" panose="020B0609030804020204" pitchFamily="49" charset="0"/>
+              </a:rPr>
+              <a:t>ux</a:t>
+            </a:r>
+            <a:r>
+              <a:rPr lang="en-US" sz="2000" dirty="0">
+                <a:solidFill>
+                  <a:srgbClr val="9FA01C"/>
+                </a:solidFill>
+                <a:latin typeface="Menlo" panose="020B0609030804020204" pitchFamily="49" charset="0"/>
+              </a:rPr>
+              <a:t>"</a:t>
+            </a:r>
+            <a:r>
+              <a:rPr lang="en-US" sz="2000" dirty="0">
+                <a:solidFill>
+                  <a:srgbClr val="000000"/>
+                </a:solidFill>
+                <a:latin typeface="Menlo" panose="020B0609030804020204" pitchFamily="49" charset="0"/>
+              </a:rPr>
+              <a:t>, </a:t>
+            </a:r>
+            <a:r>
+              <a:rPr lang="en-US" sz="2000" dirty="0">
+                <a:solidFill>
+                  <a:srgbClr val="9FA01C"/>
+                </a:solidFill>
+                <a:latin typeface="Menlo" panose="020B0609030804020204" pitchFamily="49" charset="0"/>
+              </a:rPr>
+              <a:t>"frontend"</a:t>
+            </a:r>
+            <a:r>
+              <a:rPr lang="en-US" sz="2000" dirty="0">
+                <a:solidFill>
+                  <a:srgbClr val="000000"/>
+                </a:solidFill>
+                <a:latin typeface="Menlo" panose="020B0609030804020204" pitchFamily="49" charset="0"/>
+              </a:rPr>
+              <a:t>]),</a:t>
+            </a:r>
+            <a:endParaRPr lang="en-US" sz="2000" dirty="0">
+              <a:solidFill>
+                <a:srgbClr val="9FA01C"/>
+              </a:solidFill>
+              <a:latin typeface="Menlo" panose="020B0609030804020204" pitchFamily="49" charset="0"/>
+            </a:endParaRPr>
+          </a:p>
+          <a:p>
+            <a:pPr marL="0" indent="0">
+              <a:buNone/>
+            </a:pPr>
+            <a:r>
+              <a:rPr lang="en-US" sz="2000" dirty="0">
+                <a:solidFill>
+                  <a:srgbClr val="000000"/>
+                </a:solidFill>
+                <a:latin typeface="Menlo" panose="020B0609030804020204" pitchFamily="49" charset="0"/>
+              </a:rPr>
+              <a:t>])</a:t>
+            </a:r>
+          </a:p>
+          <a:p>
+            <a:pPr marL="0" indent="0">
+              <a:buNone/>
+            </a:pPr>
+            <a:r>
+              <a:rPr lang="en-US" sz="2000" dirty="0" err="1">
+                <a:solidFill>
+                  <a:srgbClr val="000000"/>
+                </a:solidFill>
+                <a:latin typeface="Menlo" panose="020B0609030804020204" pitchFamily="49" charset="0"/>
+              </a:rPr>
+              <a:t>meta.session.flush</a:t>
+            </a:r>
+            <a:r>
+              <a:rPr lang="en-US" sz="2000" dirty="0">
+                <a:solidFill>
+                  <a:srgbClr val="000000"/>
+                </a:solidFill>
+                <a:latin typeface="Menlo" panose="020B0609030804020204" pitchFamily="49" charset="0"/>
+              </a:rPr>
+              <a:t>()</a:t>
+            </a:r>
+            <a:br>
+              <a:rPr lang="en-US" sz="2000" dirty="0">
+                <a:solidFill>
+                  <a:srgbClr val="000000"/>
+                </a:solidFill>
+                <a:latin typeface="Menlo" panose="020B0609030804020204" pitchFamily="49" charset="0"/>
+              </a:rPr>
+            </a:br>
+            <a:endParaRPr lang="en-US" sz="2000" dirty="0">
+              <a:solidFill>
+                <a:srgbClr val="000000"/>
+              </a:solidFill>
+              <a:latin typeface="Menlo" panose="020B0609030804020204" pitchFamily="49" charset="0"/>
+            </a:endParaRPr>
+          </a:p>
+          <a:p>
+            <a:pPr marL="0" indent="0">
+              <a:buNone/>
+            </a:pPr>
+            <a:r>
+              <a:rPr lang="en-US" sz="2000" dirty="0">
+                <a:solidFill>
+                  <a:srgbClr val="000000"/>
+                </a:solidFill>
+                <a:latin typeface="Menlo" panose="020B0609030804020204" pitchFamily="49" charset="0"/>
+              </a:rPr>
+              <a:t>records = (</a:t>
+            </a:r>
+          </a:p>
+          <a:p>
+            <a:pPr marL="0" indent="0">
+              <a:buNone/>
+            </a:pPr>
+            <a:r>
+              <a:rPr lang="en-US" sz="2000" dirty="0">
+                <a:solidFill>
+                  <a:srgbClr val="000000"/>
+                </a:solidFill>
+                <a:latin typeface="Menlo" panose="020B0609030804020204" pitchFamily="49" charset="0"/>
+              </a:rPr>
+              <a:t>    </a:t>
+            </a:r>
+            <a:r>
+              <a:rPr lang="en-US" sz="2000" dirty="0" err="1">
+                <a:solidFill>
+                  <a:srgbClr val="000000"/>
+                </a:solidFill>
+                <a:latin typeface="Menlo" panose="020B0609030804020204" pitchFamily="49" charset="0"/>
+              </a:rPr>
+              <a:t>meta.session.query</a:t>
+            </a:r>
+            <a:r>
+              <a:rPr lang="en-US" sz="2000" dirty="0">
+                <a:solidFill>
+                  <a:srgbClr val="000000"/>
+                </a:solidFill>
+                <a:latin typeface="Menlo" panose="020B0609030804020204" pitchFamily="49" charset="0"/>
+              </a:rPr>
+              <a:t>(</a:t>
+            </a:r>
+            <a:r>
+              <a:rPr lang="en-US" sz="2000" dirty="0" err="1">
+                <a:solidFill>
+                  <a:srgbClr val="000000"/>
+                </a:solidFill>
+                <a:latin typeface="Menlo" panose="020B0609030804020204" pitchFamily="49" charset="0"/>
+              </a:rPr>
+              <a:t>model.Record</a:t>
+            </a:r>
+            <a:r>
+              <a:rPr lang="en-US" sz="2000" dirty="0">
+                <a:solidFill>
+                  <a:srgbClr val="000000"/>
+                </a:solidFill>
+                <a:latin typeface="Menlo" panose="020B0609030804020204" pitchFamily="49" charset="0"/>
+              </a:rPr>
+              <a:t>)</a:t>
+            </a:r>
+          </a:p>
+          <a:p>
+            <a:pPr marL="0" indent="0">
+              <a:buNone/>
+            </a:pPr>
+            <a:r>
+              <a:rPr lang="en-US" sz="2000" dirty="0">
+                <a:solidFill>
+                  <a:srgbClr val="000000"/>
+                </a:solidFill>
+                <a:latin typeface="Menlo" panose="020B0609030804020204" pitchFamily="49" charset="0"/>
+              </a:rPr>
+              <a:t>        .filter(</a:t>
+            </a:r>
+            <a:r>
+              <a:rPr lang="en-US" sz="2000" dirty="0" err="1">
+                <a:solidFill>
+                  <a:srgbClr val="000000"/>
+                </a:solidFill>
+                <a:latin typeface="Menlo" panose="020B0609030804020204" pitchFamily="49" charset="0"/>
+              </a:rPr>
+              <a:t>model.Record.tags.op</a:t>
+            </a:r>
+            <a:r>
+              <a:rPr lang="en-US" sz="2000" dirty="0">
+                <a:solidFill>
+                  <a:srgbClr val="000000"/>
+                </a:solidFill>
+                <a:latin typeface="Menlo" panose="020B0609030804020204" pitchFamily="49" charset="0"/>
+              </a:rPr>
+              <a:t>(</a:t>
+            </a:r>
+            <a:r>
+              <a:rPr lang="en-US" sz="2000" dirty="0">
+                <a:solidFill>
+                  <a:srgbClr val="9FA01C"/>
+                </a:solidFill>
+                <a:latin typeface="Menlo" panose="020B0609030804020204" pitchFamily="49" charset="0"/>
+              </a:rPr>
+              <a:t>"&amp;&amp;"</a:t>
+            </a:r>
+            <a:r>
+              <a:rPr lang="en-US" sz="2000" dirty="0">
+                <a:solidFill>
+                  <a:srgbClr val="000000"/>
+                </a:solidFill>
+                <a:latin typeface="Menlo" panose="020B0609030804020204" pitchFamily="49" charset="0"/>
+              </a:rPr>
+              <a:t>)([</a:t>
+            </a:r>
+            <a:r>
+              <a:rPr lang="en-US" sz="2000" dirty="0">
+                <a:solidFill>
+                  <a:srgbClr val="9FA01C"/>
+                </a:solidFill>
+                <a:latin typeface="Menlo" panose="020B0609030804020204" pitchFamily="49" charset="0"/>
+              </a:rPr>
+              <a:t>"defect"</a:t>
+            </a:r>
+            <a:r>
+              <a:rPr lang="en-US" sz="2000" dirty="0">
+                <a:solidFill>
+                  <a:srgbClr val="000000"/>
+                </a:solidFill>
+                <a:latin typeface="Menlo" panose="020B0609030804020204" pitchFamily="49" charset="0"/>
+              </a:rPr>
+              <a:t>, </a:t>
+            </a:r>
+            <a:r>
+              <a:rPr lang="en-US" sz="2000" dirty="0">
+                <a:solidFill>
+                  <a:srgbClr val="9FA01C"/>
+                </a:solidFill>
+                <a:latin typeface="Menlo" panose="020B0609030804020204" pitchFamily="49" charset="0"/>
+              </a:rPr>
+              <a:t>"backend"</a:t>
+            </a:r>
+            <a:r>
+              <a:rPr lang="en-US" sz="2000" dirty="0">
+                <a:solidFill>
+                  <a:srgbClr val="000000"/>
+                </a:solidFill>
+                <a:latin typeface="Menlo" panose="020B0609030804020204" pitchFamily="49" charset="0"/>
+              </a:rPr>
+              <a:t>]))</a:t>
+            </a:r>
+          </a:p>
+          <a:p>
+            <a:pPr marL="0" indent="0">
+              <a:buNone/>
+            </a:pPr>
+            <a:r>
+              <a:rPr lang="en-US" sz="2000" dirty="0">
+                <a:solidFill>
+                  <a:srgbClr val="000000"/>
+                </a:solidFill>
+                <a:latin typeface="Menlo" panose="020B0609030804020204" pitchFamily="49" charset="0"/>
+              </a:rPr>
+              <a:t>)</a:t>
+            </a:r>
           </a:p>
         </p:txBody>
       </p:sp>
@@ -4801,7 +6270,7 @@
           <p:cNvPr id="2" name="Title 1">
             <a:extLst>
               <a:ext uri="{FF2B5EF4-FFF2-40B4-BE49-F238E27FC236}">
-                <a16:creationId xmlns:a16="http://schemas.microsoft.com/office/drawing/2014/main" id="{2D5809F7-8767-4B47-9582-289BECDC5EF4}"/>
+                <a16:creationId xmlns:a16="http://schemas.microsoft.com/office/drawing/2014/main" id="{74D52B37-CF49-0C43-9AD8-969DFB36930B}"/>
               </a:ext>
             </a:extLst>
           </p:cNvPr>
@@ -4819,7 +6288,7 @@
           <a:p>
             <a:r>
               <a:rPr lang="en-US" dirty="0"/>
-              <a:t>Common Table Expressions</a:t>
+              <a:t>Types and Operators (Example 01)</a:t>
             </a:r>
           </a:p>
         </p:txBody>
@@ -4829,7 +6298,7 @@
           <p:cNvPr id="3" name="Content Placeholder 2">
             <a:extLst>
               <a:ext uri="{FF2B5EF4-FFF2-40B4-BE49-F238E27FC236}">
-                <a16:creationId xmlns:a16="http://schemas.microsoft.com/office/drawing/2014/main" id="{84710E21-7F29-224E-8009-9FF48C43AD84}"/>
+                <a16:creationId xmlns:a16="http://schemas.microsoft.com/office/drawing/2014/main" id="{550D2850-CE7C-EE4B-953E-63FDD0786334}"/>
               </a:ext>
             </a:extLst>
           </p:cNvPr>
@@ -4842,61 +6311,156 @@
         </p:nvSpPr>
         <p:spPr/>
         <p:txBody>
-          <a:bodyPr/>
-          <a:lstStyle/>
-          <a:p>
-            <a:r>
-              <a:rPr lang="en-US" dirty="0"/>
-              <a:t>SQL’s ability to be abstracted is limited (another reason </a:t>
-            </a:r>
-            <a:r>
-              <a:rPr lang="en-US" dirty="0" err="1"/>
-              <a:t>SQLAlchemy</a:t>
-            </a:r>
-            <a:r>
-              <a:rPr lang="en-US" dirty="0"/>
-              <a:t> is so awesome!)</a:t>
-            </a:r>
-          </a:p>
-          <a:p>
-            <a:r>
-              <a:rPr lang="en-US" dirty="0"/>
-              <a:t>Common Table Expressions (CTEs) allow you to break your queries up into smaller, more manageable/composable pieces</a:t>
-            </a:r>
-          </a:p>
-          <a:p>
-            <a:pPr lvl="1"/>
-            <a:r>
-              <a:rPr lang="en-US" dirty="0"/>
-              <a:t>Subqueries perform this job too, but can make the rendered SQL really hard to read</a:t>
-            </a:r>
-          </a:p>
-          <a:p>
-            <a:r>
-              <a:rPr lang="en-US" dirty="0"/>
-              <a:t>Favorite uses:</a:t>
-            </a:r>
-          </a:p>
-          <a:p>
-            <a:pPr lvl="1"/>
-            <a:r>
-              <a:rPr lang="en-US" dirty="0"/>
-              <a:t>Incremental query development</a:t>
-            </a:r>
-          </a:p>
-          <a:p>
-            <a:pPr lvl="1"/>
-            <a:r>
-              <a:rPr lang="en-US" dirty="0"/>
-              <a:t>Optimization fencing</a:t>
-            </a:r>
+          <a:bodyPr>
+            <a:normAutofit/>
+          </a:bodyPr>
+          <a:lstStyle/>
+          <a:p>
+            <a:pPr marL="0" indent="0">
+              <a:buNone/>
+            </a:pPr>
+            <a:r>
+              <a:rPr lang="en-US" sz="2000" dirty="0">
+                <a:solidFill>
+                  <a:srgbClr val="000000"/>
+                </a:solidFill>
+                <a:latin typeface="Menlo" panose="020B0609030804020204" pitchFamily="49" charset="0"/>
+              </a:rPr>
+              <a:t>filtering with &amp;&amp;</a:t>
+            </a:r>
+          </a:p>
+          <a:p>
+            <a:pPr marL="0" indent="0">
+              <a:buNone/>
+            </a:pPr>
+            <a:r>
+              <a:rPr lang="en-US" sz="2000" dirty="0">
+                <a:solidFill>
+                  <a:srgbClr val="000000"/>
+                </a:solidFill>
+                <a:latin typeface="Menlo" panose="020B0609030804020204" pitchFamily="49" charset="0"/>
+              </a:rPr>
+              <a:t>+------+---------------------------------------+</a:t>
+            </a:r>
+          </a:p>
+          <a:p>
+            <a:pPr marL="0" indent="0">
+              <a:buNone/>
+            </a:pPr>
+            <a:r>
+              <a:rPr lang="en-US" sz="2000" dirty="0">
+                <a:solidFill>
+                  <a:srgbClr val="000000"/>
+                </a:solidFill>
+                <a:latin typeface="Menlo" panose="020B0609030804020204" pitchFamily="49" charset="0"/>
+              </a:rPr>
+              <a:t>|   id | tags                                  |</a:t>
+            </a:r>
+          </a:p>
+          <a:p>
+            <a:pPr marL="0" indent="0">
+              <a:buNone/>
+            </a:pPr>
+            <a:r>
+              <a:rPr lang="en-US" sz="2000" dirty="0">
+                <a:solidFill>
+                  <a:srgbClr val="000000"/>
+                </a:solidFill>
+                <a:latin typeface="Menlo" panose="020B0609030804020204" pitchFamily="49" charset="0"/>
+              </a:rPr>
+              <a:t>|------+---------------------------------------|</a:t>
+            </a:r>
+          </a:p>
+          <a:p>
+            <a:pPr marL="0" indent="0">
+              <a:buNone/>
+            </a:pPr>
+            <a:r>
+              <a:rPr lang="en-US" sz="2000" dirty="0">
+                <a:solidFill>
+                  <a:srgbClr val="000000"/>
+                </a:solidFill>
+                <a:latin typeface="Menlo" panose="020B0609030804020204" pitchFamily="49" charset="0"/>
+              </a:rPr>
+              <a:t>|    1 | ['defect', '</a:t>
+            </a:r>
+            <a:r>
+              <a:rPr lang="en-US" sz="2000" dirty="0" err="1">
+                <a:solidFill>
+                  <a:srgbClr val="000000"/>
+                </a:solidFill>
+                <a:latin typeface="Menlo" panose="020B0609030804020204" pitchFamily="49" charset="0"/>
+              </a:rPr>
+              <a:t>minor_change</a:t>
+            </a:r>
+            <a:r>
+              <a:rPr lang="en-US" sz="2000" dirty="0">
+                <a:solidFill>
+                  <a:srgbClr val="000000"/>
+                </a:solidFill>
+                <a:latin typeface="Menlo" panose="020B0609030804020204" pitchFamily="49" charset="0"/>
+              </a:rPr>
+              <a:t>', 'backend'] |</a:t>
+            </a:r>
+          </a:p>
+          <a:p>
+            <a:pPr marL="0" indent="0">
+              <a:buNone/>
+            </a:pPr>
+            <a:r>
+              <a:rPr lang="en-US" sz="2000" dirty="0">
+                <a:solidFill>
+                  <a:srgbClr val="000000"/>
+                </a:solidFill>
+                <a:latin typeface="Menlo" panose="020B0609030804020204" pitchFamily="49" charset="0"/>
+              </a:rPr>
+              <a:t>|    2 | ['defect', '</a:t>
+            </a:r>
+            <a:r>
+              <a:rPr lang="en-US" sz="2000" dirty="0" err="1">
+                <a:solidFill>
+                  <a:srgbClr val="000000"/>
+                </a:solidFill>
+                <a:latin typeface="Menlo" panose="020B0609030804020204" pitchFamily="49" charset="0"/>
+              </a:rPr>
+              <a:t>major_change</a:t>
+            </a:r>
+            <a:r>
+              <a:rPr lang="en-US" sz="2000" dirty="0">
+                <a:solidFill>
+                  <a:srgbClr val="000000"/>
+                </a:solidFill>
+                <a:latin typeface="Menlo" panose="020B0609030804020204" pitchFamily="49" charset="0"/>
+              </a:rPr>
+              <a:t>', 'backend'] |</a:t>
+            </a:r>
+          </a:p>
+          <a:p>
+            <a:pPr marL="0" indent="0">
+              <a:buNone/>
+            </a:pPr>
+            <a:r>
+              <a:rPr lang="en-US" sz="2000" dirty="0">
+                <a:solidFill>
+                  <a:srgbClr val="000000"/>
+                </a:solidFill>
+                <a:latin typeface="Menlo" panose="020B0609030804020204" pitchFamily="49" charset="0"/>
+              </a:rPr>
+              <a:t>+------+---------------------------------------+</a:t>
+            </a:r>
+          </a:p>
+          <a:p>
+            <a:pPr marL="0" indent="0">
+              <a:buNone/>
+            </a:pPr>
+            <a:endParaRPr lang="en-US" sz="2000" dirty="0"/>
           </a:p>
         </p:txBody>
       </p:sp>
     </p:spTree>
     <p:extLst>
       <p:ext uri="{BB962C8B-B14F-4D97-AF65-F5344CB8AC3E}">
-        <p14:creationId xmlns:p14="http://schemas.microsoft.com/office/powerpoint/2010/main" val="2504300282"/>
+        <p14:creationId xmlns:p14="http://schemas.microsoft.com/office/powerpoint/2010/main" val="2411718679"/>
       </p:ext>
     </p:extLst>
   </p:cSld>

</xml_diff>